<commit_message>
Title and content text.
</commit_message>
<xml_diff>
--- a/my_pptx_1.pptx
+++ b/my_pptx_1.pptx
@@ -1,11 +1,12 @@
 
 <file path=ppt/presentation.xml><?xml version="1.0" encoding="utf-8"?>
-<p:presentation xmlns:p="http://schemas.openxmlformats.org/presentationml/2006/main">
+<p:presentation xmlns:r="http://schemas.openxmlformats.org/officeDocument/2006/relationships" xmlns:p="http://schemas.openxmlformats.org/presentationml/2006/main">
   <p:sldMasterIdLst>
     <p:sldMasterId xmlns:r="http://schemas.openxmlformats.org/officeDocument/2006/relationships" id="2147483648" r:id="rId1"/>
   </p:sldMasterIdLst>
   <p:sldIdLst>
     <p:sldId xmlns:r="http://schemas.openxmlformats.org/officeDocument/2006/relationships" id="256" r:id="rId2"/>
+    <p:sldId id="257" r:id="R5f5ecdf249b1453e"/>
   </p:sldIdLst>
   <p:sldSz cx="9144000" cy="6858000" type="screen4x3"/>
   <p:notesSz cx="6858000" cy="9144000"/>
@@ -14,7 +15,7 @@
 </file>
 
 <file path=ppt/slideLayouts/slideLayout1.xml><?xml version="1.0" encoding="utf-8"?>
-<p:sldLayout xmlns:p="http://schemas.openxmlformats.org/presentationml/2006/main">
+<p:sldLayout xmlns:p="http://schemas.openxmlformats.org/presentationml/2006/main" type="title">
   <p:cSld>
     <p:spTree>
       <p:nvGrpSpPr>
@@ -319,9 +320,46 @@
           <a:p xmlns:a="http://schemas.openxmlformats.org/drawingml/2006/main">
             <a:endParaRPr lang="en-US"/>
           </a:p>
+        </p:txBody>
+      </p:sp>
+      <p:sp>
+        <p:nvSpPr>
+          <p:cNvPr id="3" name="Title"/>
+          <p:cNvSpPr>
+            <a:spLocks xmlns:a="http://schemas.openxmlformats.org/drawingml/2006/main" noGrp="1"/>
+          </p:cNvSpPr>
+          <p:nvPr>
+            <p:ph type="title"/>
+          </p:nvPr>
+        </p:nvSpPr>
+        <p:spPr/>
+        <p:txBody>
+          <a:bodyPr xmlns:a="http://schemas.openxmlformats.org/drawingml/2006/main"/>
+          <a:lstStyle xmlns:a="http://schemas.openxmlformats.org/drawingml/2006/main"/>
           <a:p xmlns:a="http://schemas.openxmlformats.org/drawingml/2006/main">
             <a:r>
-              <a:t>THIS IS MY TITLE</a:t>
+              <a:t>This is the title!</a:t>
+            </a:r>
+          </a:p>
+        </p:txBody>
+      </p:sp>
+      <p:sp>
+        <p:nvSpPr>
+          <p:cNvPr id="4" name="Content"/>
+          <p:cNvSpPr>
+            <a:spLocks xmlns:a="http://schemas.openxmlformats.org/drawingml/2006/main" noGrp="1"/>
+          </p:cNvSpPr>
+          <p:nvPr>
+            <p:ph idx="1"/>
+          </p:nvPr>
+        </p:nvSpPr>
+        <p:spPr/>
+        <p:txBody>
+          <a:bodyPr xmlns:a="http://schemas.openxmlformats.org/drawingml/2006/main"/>
+          <a:lstStyle xmlns:a="http://schemas.openxmlformats.org/drawingml/2006/main"/>
+          <a:p xmlns:a="http://schemas.openxmlformats.org/drawingml/2006/main">
+            <a:r>
+              <a:t>This is the content!</a:t>
             </a:r>
           </a:p>
         </p:txBody>
@@ -332,4 +370,61 @@
     <a:masterClrMapping xmlns:a="http://schemas.openxmlformats.org/drawingml/2006/main"/>
   </p:clrMapOvr>
 </p:sld>
+</file>
+
+<file path=ppt/slides/slide2.xml><?xml version="1.0" encoding="utf-8"?>
+<p:sld xmlns:p="http://schemas.openxmlformats.org/presentationml/2006/main">
+  <p:cSld>
+    <p:spTree>
+      <p:nvGrpSpPr>
+        <p:cNvPr id="1" name=""/>
+        <p:cNvGrpSpPr/>
+        <p:nvPr/>
+      </p:nvGrpSpPr>
+      <p:grpSpPr/>
+      <p:sp>
+        <p:nvSpPr>
+          <p:cNvPr id="2" name="Title"/>
+          <p:cNvSpPr>
+            <a:spLocks xmlns:a="http://schemas.openxmlformats.org/drawingml/2006/main" noGrp="1"/>
+          </p:cNvSpPr>
+          <p:nvPr>
+            <p:ph type="title"/>
+          </p:nvPr>
+        </p:nvSpPr>
+        <p:spPr/>
+        <p:txBody>
+          <a:bodyPr xmlns:a="http://schemas.openxmlformats.org/drawingml/2006/main"/>
+          <a:lstStyle xmlns:a="http://schemas.openxmlformats.org/drawingml/2006/main"/>
+          <a:p xmlns:a="http://schemas.openxmlformats.org/drawingml/2006/main">
+            <a:r>
+              <a:t>My new slide.</a:t>
+            </a:r>
+          </a:p>
+        </p:txBody>
+      </p:sp>
+      <p:sp>
+        <p:nvSpPr>
+          <p:cNvPr id="3" name="Content Placeholder"/>
+          <p:cNvSpPr>
+            <a:spLocks xmlns:a="http://schemas.openxmlformats.org/drawingml/2006/main" noGrp="1"/>
+          </p:cNvSpPr>
+          <p:nvPr>
+            <p:ph idx="1"/>
+          </p:nvPr>
+        </p:nvSpPr>
+        <p:spPr/>
+        <p:txBody>
+          <a:bodyPr xmlns:a="http://schemas.openxmlformats.org/drawingml/2006/main"/>
+          <a:lstStyle xmlns:a="http://schemas.openxmlformats.org/drawingml/2006/main"/>
+          <a:p xmlns:a="http://schemas.openxmlformats.org/drawingml/2006/main">
+            <a:r>
+              <a:t>This is the body!</a:t>
+            </a:r>
+          </a:p>
+        </p:txBody>
+      </p:sp>
+    </p:spTree>
+  </p:cSld>
+</p:sld>
 </file>
</xml_diff>